<commit_message>
minor launguage bugs fixed
</commit_message>
<xml_diff>
--- a/1 - introduction/DLMR _1_TURKİSH.pptx
+++ b/1 - introduction/DLMR _1_TURKİSH.pptx
@@ -275,7 +275,7 @@
             <a:fld id="{BEA74EB7-856E-45FD-83F0-5F7C6F3E4372}" type="datetimeFigureOut">
               <a:rPr lang="tr-TR" smtClean="0"/>
               <a:pPr/>
-              <a:t>1.11.2018</a:t>
+              <a:t>2.11.2018</a:t>
             </a:fld>
             <a:endParaRPr lang="tr-TR" dirty="0"/>
           </a:p>
@@ -442,7 +442,7 @@
             <a:fld id="{C61B0E40-8125-41F8-BB6C-139D8D531A4F}" type="datetimeFigureOut">
               <a:rPr lang="tr-TR" smtClean="0"/>
               <a:pPr/>
-              <a:t>1.11.2018</a:t>
+              <a:t>2.11.2018</a:t>
             </a:fld>
             <a:endParaRPr lang="tr-TR" dirty="0"/>
           </a:p>
@@ -1262,7 +1262,7 @@
             <a:fld id="{8E36636D-D922-432D-A958-524484B5923D}" type="datetimeFigureOut">
               <a:rPr lang="tr-TR" smtClean="0"/>
               <a:pPr/>
-              <a:t>1.11.2018</a:t>
+              <a:t>2.11.2018</a:t>
             </a:fld>
             <a:endParaRPr lang="tr-TR" dirty="0"/>
           </a:p>
@@ -1462,7 +1462,7 @@
             <a:fld id="{8E36636D-D922-432D-A958-524484B5923D}" type="datetimeFigureOut">
               <a:rPr lang="tr-TR" smtClean="0"/>
               <a:pPr/>
-              <a:t>1.11.2018</a:t>
+              <a:t>2.11.2018</a:t>
             </a:fld>
             <a:endParaRPr lang="tr-TR" dirty="0"/>
           </a:p>
@@ -1672,7 +1672,7 @@
             <a:fld id="{8E36636D-D922-432D-A958-524484B5923D}" type="datetimeFigureOut">
               <a:rPr lang="tr-TR" smtClean="0"/>
               <a:pPr/>
-              <a:t>1.11.2018</a:t>
+              <a:t>2.11.2018</a:t>
             </a:fld>
             <a:endParaRPr lang="tr-TR" dirty="0"/>
           </a:p>
@@ -1862,7 +1862,7 @@
             <a:fld id="{8E36636D-D922-432D-A958-524484B5923D}" type="datetimeFigureOut">
               <a:rPr lang="tr-TR" smtClean="0"/>
               <a:pPr/>
-              <a:t>1.11.2018</a:t>
+              <a:t>2.11.2018</a:t>
             </a:fld>
             <a:endParaRPr lang="tr-TR" dirty="0"/>
           </a:p>
@@ -2135,7 +2135,7 @@
             <a:fld id="{8E36636D-D922-432D-A958-524484B5923D}" type="datetimeFigureOut">
               <a:rPr lang="tr-TR" smtClean="0"/>
               <a:pPr/>
-              <a:t>1.11.2018</a:t>
+              <a:t>2.11.2018</a:t>
             </a:fld>
             <a:endParaRPr lang="tr-TR" dirty="0"/>
           </a:p>
@@ -2457,7 +2457,7 @@
             <a:fld id="{8E36636D-D922-432D-A958-524484B5923D}" type="datetimeFigureOut">
               <a:rPr lang="tr-TR" smtClean="0"/>
               <a:pPr/>
-              <a:t>1.11.2018</a:t>
+              <a:t>2.11.2018</a:t>
             </a:fld>
             <a:endParaRPr lang="tr-TR" dirty="0"/>
           </a:p>
@@ -2907,7 +2907,7 @@
             <a:fld id="{8E36636D-D922-432D-A958-524484B5923D}" type="datetimeFigureOut">
               <a:rPr lang="tr-TR" smtClean="0"/>
               <a:pPr/>
-              <a:t>1.11.2018</a:t>
+              <a:t>2.11.2018</a:t>
             </a:fld>
             <a:endParaRPr lang="tr-TR" dirty="0"/>
           </a:p>
@@ -3039,7 +3039,7 @@
             <a:fld id="{8E36636D-D922-432D-A958-524484B5923D}" type="datetimeFigureOut">
               <a:rPr lang="tr-TR" smtClean="0"/>
               <a:pPr/>
-              <a:t>1.11.2018</a:t>
+              <a:t>2.11.2018</a:t>
             </a:fld>
             <a:endParaRPr lang="tr-TR" dirty="0"/>
           </a:p>
@@ -3298,7 +3298,7 @@
             <a:fld id="{8E36636D-D922-432D-A958-524484B5923D}" type="datetimeFigureOut">
               <a:rPr lang="tr-TR" smtClean="0"/>
               <a:pPr/>
-              <a:t>1.11.2018</a:t>
+              <a:t>2.11.2018</a:t>
             </a:fld>
             <a:endParaRPr lang="tr-TR" dirty="0"/>
           </a:p>
@@ -3645,7 +3645,7 @@
             <a:fld id="{8E36636D-D922-432D-A958-524484B5923D}" type="datetimeFigureOut">
               <a:rPr lang="tr-TR" smtClean="0"/>
               <a:pPr/>
-              <a:t>1.11.2018</a:t>
+              <a:t>2.11.2018</a:t>
             </a:fld>
             <a:endParaRPr lang="tr-TR" dirty="0"/>
           </a:p>
@@ -3980,7 +3980,7 @@
             <a:fld id="{8E36636D-D922-432D-A958-524484B5923D}" type="datetimeFigureOut">
               <a:rPr lang="tr-TR" smtClean="0"/>
               <a:pPr/>
-              <a:t>1.11.2018</a:t>
+              <a:t>2.11.2018</a:t>
             </a:fld>
             <a:endParaRPr lang="tr-TR" dirty="0"/>
           </a:p>
@@ -4506,7 +4506,7 @@
             <a:fld id="{8E36636D-D922-432D-A958-524484B5923D}" type="datetimeFigureOut">
               <a:rPr lang="tr-TR" smtClean="0"/>
               <a:pPr/>
-              <a:t>1.11.2018</a:t>
+              <a:t>2.11.2018</a:t>
             </a:fld>
             <a:endParaRPr lang="tr-TR" dirty="0"/>
           </a:p>
@@ -7322,7 +7322,7 @@
           <a:p>
             <a:r>
               <a:rPr lang="tr-TR" dirty="0"/>
-              <a:t>Görüntüleme teknolojisi testi yapınca gerekli ise </a:t>
+              <a:t>Görüntüleme teknolojisi önce </a:t>
             </a:r>
             <a:r>
               <a:rPr lang="tr-TR" dirty="0" err="1"/>
@@ -7330,7 +7330,7 @@
             </a:r>
             <a:r>
               <a:rPr lang="tr-TR" dirty="0"/>
-              <a:t> yönlendirir (?)</a:t>
+              <a:t> danışmayı sonrasında onun tarafından yapılan genişlemiş göz testini içerir</a:t>
             </a:r>
           </a:p>
         </p:txBody>
@@ -8180,7 +8180,7 @@
             </a:r>
             <a:r>
               <a:rPr lang="tr-TR" dirty="0" err="1"/>
-              <a:t>phyton</a:t>
+              <a:t>python</a:t>
             </a:r>
             <a:r>
               <a:rPr lang="tr-TR" dirty="0"/>
@@ -8206,7 +8206,7 @@
             </a:r>
             <a:r>
               <a:rPr lang="tr-TR" dirty="0" err="1"/>
-              <a:t>phyton</a:t>
+              <a:t>python</a:t>
             </a:r>
             <a:r>
               <a:rPr lang="tr-TR" dirty="0"/>
@@ -8258,7 +8258,7 @@
             </a:r>
             <a:r>
               <a:rPr lang="tr-TR" dirty="0" err="1"/>
-              <a:t>phyton</a:t>
+              <a:t>python</a:t>
             </a:r>
             <a:r>
               <a:rPr lang="tr-TR" dirty="0"/>
@@ -9085,7 +9085,7 @@
           <a:p>
             <a:r>
               <a:rPr lang="tr-TR" dirty="0"/>
-              <a:t>Eğer bir problem size rutin veya amelelik geliyor ise büyük ihtimal AI  şuan için yerini almayacaktır</a:t>
+              <a:t>Eğer bir problem size rutin veya amelelik gelmiyor ise büyük ihtimal AI  şuan için yerini almayacaktır</a:t>
             </a:r>
           </a:p>
           <a:p>
@@ -9556,7 +9556,15 @@
             <a:pPr lvl="1"/>
             <a:r>
               <a:rPr lang="tr-TR" dirty="0"/>
-              <a:t>İstatistiki denklemlerinin daha etkili çözümleriyle ilgilenen matematik bilimi</a:t>
+              <a:t>İstatistiki denklemlerinin daha etkili çözümleriyle ilgilenen matematik bilimi. Veri </a:t>
+            </a:r>
+            <a:r>
+              <a:rPr lang="tr-TR" dirty="0" err="1"/>
+              <a:t>bilimimini</a:t>
+            </a:r>
+            <a:r>
+              <a:rPr lang="tr-TR" dirty="0"/>
+              <a:t> derinlemesine inceleme ,temizleme ve sunmanın yanı sıra analitik yetenek ve alan hakimiyeti gerektirir</a:t>
             </a:r>
           </a:p>
           <a:p>
@@ -9665,15 +9673,7 @@
             <a:pPr lvl="1"/>
             <a:r>
               <a:rPr lang="tr-TR" dirty="0"/>
-              <a:t>Konseptlerin daha basitleriyle ilişkilendirildiği , tecrübe ederek </a:t>
-            </a:r>
-            <a:r>
-              <a:rPr lang="tr-TR" dirty="0" err="1"/>
-              <a:t>hiyeraşi</a:t>
-            </a:r>
-            <a:r>
-              <a:rPr lang="tr-TR" dirty="0"/>
-              <a:t> konseptlerini anlayan algoritmalardır</a:t>
+              <a:t>Her konseptin daha basitiyle ilişkilendirilmesiyle deneyimden öğrenen algoritmalar, dünyayı konseptler hiyerarşisi bakımından anlamlandırır. </a:t>
             </a:r>
           </a:p>
         </p:txBody>

</xml_diff>